<commit_message>
njarebou fel mise a jour
</commit_message>
<xml_diff>
--- a/CheckpointWebdevelopment.pptx
+++ b/CheckpointWebdevelopment.pptx
@@ -5,15 +5,16 @@
     <p:sldMasterId id="2147483648" r:id="rId1"/>
   </p:sldMasterIdLst>
   <p:notesMasterIdLst>
-    <p:notesMasterId r:id="rId6"/>
+    <p:notesMasterId r:id="rId7"/>
   </p:notesMasterIdLst>
   <p:handoutMasterIdLst>
-    <p:handoutMasterId r:id="rId7"/>
+    <p:handoutMasterId r:id="rId8"/>
   </p:handoutMasterIdLst>
   <p:sldIdLst>
     <p:sldId id="256" r:id="rId3"/>
     <p:sldId id="257" r:id="rId4"/>
     <p:sldId id="258" r:id="rId5"/>
+    <p:sldId id="259" r:id="rId6"/>
   </p:sldIdLst>
   <p:sldSz cx="12192000" cy="6858000"/>
   <p:notesSz cx="7103745" cy="10234295"/>
@@ -7715,6 +7716,60 @@
 </p:sld>
 </file>
 
+<file path=ppt/slides/slide4.xml><?xml version="1.0" encoding="utf-8"?>
+<p:sld xmlns:a="http://schemas.openxmlformats.org/drawingml/2006/main" xmlns:r="http://schemas.openxmlformats.org/officeDocument/2006/relationships" xmlns:p="http://schemas.openxmlformats.org/presentationml/2006/main">
+  <p:cSld>
+    <p:spTree>
+      <p:nvGrpSpPr>
+        <p:cNvPr id="1" name=""/>
+        <p:cNvGrpSpPr/>
+        <p:nvPr/>
+      </p:nvGrpSpPr>
+      <p:grpSpPr/>
+      <p:sp>
+        <p:nvSpPr>
+          <p:cNvPr id="2" name="Titre 1"/>
+          <p:cNvSpPr>
+            <a:spLocks noGrp="1"/>
+          </p:cNvSpPr>
+          <p:nvPr>
+            <p:ph type="title"/>
+          </p:nvPr>
+        </p:nvSpPr>
+        <p:spPr/>
+        <p:txBody>
+          <a:bodyPr/>
+          <a:p>
+            <a:endParaRPr lang="fr-FR" altLang="en-US"/>
+          </a:p>
+        </p:txBody>
+      </p:sp>
+      <p:sp>
+        <p:nvSpPr>
+          <p:cNvPr id="3" name="Espace réservé du contenu 2"/>
+          <p:cNvSpPr>
+            <a:spLocks noGrp="1"/>
+          </p:cNvSpPr>
+          <p:nvPr>
+            <p:ph idx="1"/>
+          </p:nvPr>
+        </p:nvSpPr>
+        <p:spPr/>
+        <p:txBody>
+          <a:bodyPr/>
+          <a:p>
+            <a:endParaRPr lang="fr-FR" altLang="en-US"/>
+          </a:p>
+        </p:txBody>
+      </p:sp>
+    </p:spTree>
+  </p:cSld>
+  <p:clrMapOvr>
+    <a:masterClrMapping/>
+  </p:clrMapOvr>
+</p:sld>
+</file>
+
 <file path=ppt/theme/theme1.xml><?xml version="1.0" encoding="utf-8"?>
 <a:theme xmlns:a="http://schemas.openxmlformats.org/drawingml/2006/main" name="Office Theme">
   <a:themeElements>

</xml_diff>